<commit_message>
Modified README and powerpoint. Added website dashboard screenshot
</commit_message>
<xml_diff>
--- a/Resources/housing_price_prediction.pptx
+++ b/Resources/housing_price_prediction.pptx
@@ -7,7 +7,7 @@
     <p:sldMasterId id="2147483674" r:id="rId3"/>
   </p:sldMasterIdLst>
   <p:notesMasterIdLst>
-    <p:notesMasterId r:id="rId21"/>
+    <p:notesMasterId r:id="rId20"/>
   </p:notesMasterIdLst>
   <p:sldIdLst>
     <p:sldId id="256" r:id="rId4"/>
@@ -24,9 +24,8 @@
     <p:sldId id="304" r:id="rId15"/>
     <p:sldId id="305" r:id="rId16"/>
     <p:sldId id="306" r:id="rId17"/>
-    <p:sldId id="307" r:id="rId18"/>
-    <p:sldId id="308" r:id="rId19"/>
-    <p:sldId id="264" r:id="rId20"/>
+    <p:sldId id="308" r:id="rId18"/>
+    <p:sldId id="264" r:id="rId19"/>
   </p:sldIdLst>
   <p:sldSz cx="10080625" cy="7559675"/>
   <p:notesSz cx="7772400" cy="10058400"/>
@@ -1144,8 +1143,38 @@
             </a:pPr>
             <a:r>
               <a:rPr lang="en-US" dirty="0"/>
-              <a:t>Present the website and display it’s functionality</a:t>
+              <a:t>Present the website and display it’s functionality.</a:t>
             </a:r>
+          </a:p>
+          <a:p>
+            <a:pPr marL="171450" marR="0" lvl="0" indent="-171450" algn="l" defTabSz="914400" rtl="0" eaLnBrk="1" fontAlgn="auto" latinLnBrk="0" hangingPunct="1">
+              <a:lnSpc>
+                <a:spcPct val="100000"/>
+              </a:lnSpc>
+              <a:spcBef>
+                <a:spcPts val="0"/>
+              </a:spcBef>
+              <a:spcAft>
+                <a:spcPts val="0"/>
+              </a:spcAft>
+              <a:buClrTx/>
+              <a:buSzTx/>
+              <a:buFont typeface="Arial" panose="020B0604020202020204" pitchFamily="34" charset="0"/>
+              <a:buChar char="•"/>
+              <a:tabLst/>
+              <a:defRPr/>
+            </a:pPr>
+            <a:r>
+              <a:rPr lang="en-US" dirty="0"/>
+              <a:t>Discuss how you deployed the application to Heroku and any challenges you faced.</a:t>
+            </a:r>
+          </a:p>
+          <a:p>
+            <a:pPr marL="171450" indent="-171450">
+              <a:buFont typeface="Arial" panose="020B0604020202020204" pitchFamily="34" charset="0"/>
+              <a:buChar char="•"/>
+            </a:pPr>
+            <a:endParaRPr lang="en-US" dirty="0"/>
           </a:p>
           <a:p>
             <a:pPr marL="171450" indent="-171450">
@@ -1251,7 +1280,17 @@
             </a:pPr>
             <a:r>
               <a:rPr lang="en-US" dirty="0"/>
-              <a:t>Discuss how you deployed the application to Heroku and any challenges you faced.</a:t>
+              <a:t>Discuss two to three things that you would like to do to improve upon the project in the future.</a:t>
+            </a:r>
+          </a:p>
+          <a:p>
+            <a:pPr marL="171450" indent="-171450">
+              <a:buFont typeface="Arial" panose="020B0604020202020204" pitchFamily="34" charset="0"/>
+              <a:buChar char="•"/>
+            </a:pPr>
+            <a:r>
+              <a:rPr lang="en-US" dirty="0"/>
+              <a:t>Ask for any questions from the class.</a:t>
             </a:r>
           </a:p>
         </p:txBody>
@@ -1282,7 +1321,7 @@
     </p:spTree>
     <p:extLst>
       <p:ext uri="{BB962C8B-B14F-4D97-AF65-F5344CB8AC3E}">
-        <p14:creationId xmlns:p14="http://schemas.microsoft.com/office/powerpoint/2010/main" val="802541405"/>
+        <p14:creationId xmlns:p14="http://schemas.microsoft.com/office/powerpoint/2010/main" val="4165236267"/>
       </p:ext>
     </p:extLst>
   </p:cSld>
@@ -1351,7 +1390,7 @@
             </a:pPr>
             <a:r>
               <a:rPr lang="en-US" dirty="0"/>
-              <a:t>Discuss two to three things that you would like to do to improve upon the project in the future.</a:t>
+              <a:t>End the presentation.</a:t>
             </a:r>
           </a:p>
         </p:txBody>
@@ -1374,106 +1413,6 @@
             <a:fld id="{9B3EE759-B149-42C4-99AB-C91570C54BBF}" type="slidenum">
               <a:rPr lang="en-US" smtClean="0"/>
               <a:t>16</a:t>
-            </a:fld>
-            <a:endParaRPr lang="en-US"/>
-          </a:p>
-        </p:txBody>
-      </p:sp>
-    </p:spTree>
-    <p:extLst>
-      <p:ext uri="{BB962C8B-B14F-4D97-AF65-F5344CB8AC3E}">
-        <p14:creationId xmlns:p14="http://schemas.microsoft.com/office/powerpoint/2010/main" val="4165236267"/>
-      </p:ext>
-    </p:extLst>
-  </p:cSld>
-  <p:clrMapOvr>
-    <a:masterClrMapping/>
-  </p:clrMapOvr>
-</p:notes>
-</file>
-
-<file path=ppt/notesSlides/notesSlide17.xml><?xml version="1.0" encoding="utf-8"?>
-<p:notes xmlns:a="http://schemas.openxmlformats.org/drawingml/2006/main" xmlns:r="http://schemas.openxmlformats.org/officeDocument/2006/relationships" xmlns:p="http://schemas.openxmlformats.org/presentationml/2006/main">
-  <p:cSld>
-    <p:spTree>
-      <p:nvGrpSpPr>
-        <p:cNvPr id="1" name=""/>
-        <p:cNvGrpSpPr/>
-        <p:nvPr/>
-      </p:nvGrpSpPr>
-      <p:grpSpPr>
-        <a:xfrm>
-          <a:off x="0" y="0"/>
-          <a:ext cx="0" cy="0"/>
-          <a:chOff x="0" y="0"/>
-          <a:chExt cx="0" cy="0"/>
-        </a:xfrm>
-      </p:grpSpPr>
-      <p:sp>
-        <p:nvSpPr>
-          <p:cNvPr id="2" name="Slide Image Placeholder 1"/>
-          <p:cNvSpPr>
-            <a:spLocks noGrp="1" noRot="1" noChangeAspect="1"/>
-          </p:cNvSpPr>
-          <p:nvPr>
-            <p:ph type="sldImg"/>
-          </p:nvPr>
-        </p:nvSpPr>
-        <p:spPr/>
-      </p:sp>
-      <p:sp>
-        <p:nvSpPr>
-          <p:cNvPr id="3" name="Notes Placeholder 2"/>
-          <p:cNvSpPr>
-            <a:spLocks noGrp="1"/>
-          </p:cNvSpPr>
-          <p:nvPr>
-            <p:ph type="body" idx="1"/>
-          </p:nvPr>
-        </p:nvSpPr>
-        <p:spPr/>
-        <p:txBody>
-          <a:bodyPr/>
-          <a:lstStyle/>
-          <a:p>
-            <a:r>
-              <a:rPr lang="en-US" b="1" dirty="0"/>
-              <a:t>MC</a:t>
-            </a:r>
-          </a:p>
-          <a:p>
-            <a:endParaRPr lang="en-US" dirty="0"/>
-          </a:p>
-          <a:p>
-            <a:pPr marL="171450" indent="-171450">
-              <a:buFont typeface="Arial" panose="020B0604020202020204" pitchFamily="34" charset="0"/>
-              <a:buChar char="•"/>
-            </a:pPr>
-            <a:r>
-              <a:rPr lang="en-US" dirty="0"/>
-              <a:t>End the presentation.</a:t>
-            </a:r>
-          </a:p>
-        </p:txBody>
-      </p:sp>
-      <p:sp>
-        <p:nvSpPr>
-          <p:cNvPr id="4" name="Slide Number Placeholder 3"/>
-          <p:cNvSpPr>
-            <a:spLocks noGrp="1"/>
-          </p:cNvSpPr>
-          <p:nvPr>
-            <p:ph type="sldNum" sz="quarter" idx="5"/>
-          </p:nvPr>
-        </p:nvSpPr>
-        <p:spPr/>
-        <p:txBody>
-          <a:bodyPr/>
-          <a:lstStyle/>
-          <a:p>
-            <a:fld id="{9B3EE759-B149-42C4-99AB-C91570C54BBF}" type="slidenum">
-              <a:rPr lang="en-US" smtClean="0"/>
-              <a:t>17</a:t>
             </a:fld>
             <a:endParaRPr lang="en-US"/>
           </a:p>
@@ -9161,8 +9100,8 @@
         </p:nvSpPr>
         <p:spPr>
           <a:xfrm>
-            <a:off x="502918" y="2261681"/>
-            <a:ext cx="9071640" cy="4383720"/>
+            <a:off x="502918" y="2261680"/>
+            <a:ext cx="4900355" cy="4174745"/>
           </a:xfrm>
           <a:prstGeom prst="rect">
             <a:avLst/>
@@ -9186,7 +9125,7 @@
         </p:style>
         <p:txBody>
           <a:bodyPr lIns="0" tIns="0" rIns="0" bIns="0">
-            <a:normAutofit lnSpcReduction="10000"/>
+            <a:noAutofit/>
           </a:bodyPr>
           <a:lstStyle/>
           <a:p>
@@ -9205,11 +9144,30 @@
               <a:buChar char="Ø"/>
             </a:pPr>
             <a:r>
-              <a:rPr lang="en-US" sz="3200" b="0" strike="noStrike" spc="-1" dirty="0">
+              <a:rPr lang="en-US" sz="2800" b="0" strike="noStrike" spc="-1" dirty="0">
                 <a:latin typeface="Noto Sans Black"/>
               </a:rPr>
               <a:t>Linear Regression Model</a:t>
             </a:r>
+          </a:p>
+          <a:p>
+            <a:pPr marL="565560" indent="-457200">
+              <a:lnSpc>
+                <a:spcPct val="100000"/>
+              </a:lnSpc>
+              <a:spcBef>
+                <a:spcPts val="1417"/>
+              </a:spcBef>
+              <a:buClr>
+                <a:srgbClr val="000000"/>
+              </a:buClr>
+              <a:buSzPct val="45000"/>
+              <a:buFont typeface="Wingdings" panose="05000000000000000000" pitchFamily="2" charset="2"/>
+              <a:buChar char="Ø"/>
+            </a:pPr>
+            <a:endParaRPr lang="en-US" sz="2800" b="0" strike="noStrike" spc="-1" dirty="0">
+              <a:latin typeface="Noto Sans Black"/>
+            </a:endParaRPr>
           </a:p>
           <a:p>
             <a:pPr marL="565560" indent="-457200">
@@ -9227,11 +9185,30 @@
               <a:buChar char="Ø"/>
             </a:pPr>
             <a:r>
-              <a:rPr lang="en-US" sz="3200" b="0" strike="noStrike" spc="-1" dirty="0">
+              <a:rPr lang="en-US" sz="2800" b="0" strike="noStrike" spc="-1" dirty="0">
                 <a:latin typeface="Noto Sans Black"/>
               </a:rPr>
               <a:t>Random Forests Model</a:t>
             </a:r>
+          </a:p>
+          <a:p>
+            <a:pPr marL="565560" indent="-457200">
+              <a:lnSpc>
+                <a:spcPct val="100000"/>
+              </a:lnSpc>
+              <a:spcBef>
+                <a:spcPts val="1417"/>
+              </a:spcBef>
+              <a:buClr>
+                <a:srgbClr val="000000"/>
+              </a:buClr>
+              <a:buSzPct val="45000"/>
+              <a:buFont typeface="Wingdings" panose="05000000000000000000" pitchFamily="2" charset="2"/>
+              <a:buChar char="Ø"/>
+            </a:pPr>
+            <a:endParaRPr lang="en-US" sz="2800" b="0" strike="noStrike" spc="-1" dirty="0">
+              <a:latin typeface="Noto Sans Black"/>
+            </a:endParaRPr>
           </a:p>
           <a:p>
             <a:pPr marL="565560" indent="-457200">
@@ -9249,11 +9226,30 @@
               <a:buChar char="Ø"/>
             </a:pPr>
             <a:r>
-              <a:rPr lang="en-US" sz="3200" spc="-1" dirty="0">
+              <a:rPr lang="en-US" sz="2800" spc="-1" dirty="0">
                 <a:latin typeface="Noto Sans Black"/>
               </a:rPr>
               <a:t>Decision Tree Model</a:t>
             </a:r>
+          </a:p>
+          <a:p>
+            <a:pPr marL="565560" indent="-457200">
+              <a:lnSpc>
+                <a:spcPct val="100000"/>
+              </a:lnSpc>
+              <a:spcBef>
+                <a:spcPts val="1417"/>
+              </a:spcBef>
+              <a:buClr>
+                <a:srgbClr val="000000"/>
+              </a:buClr>
+              <a:buSzPct val="45000"/>
+              <a:buFont typeface="Wingdings" panose="05000000000000000000" pitchFamily="2" charset="2"/>
+              <a:buChar char="Ø"/>
+            </a:pPr>
+            <a:endParaRPr lang="en-US" sz="2800" spc="-1" dirty="0">
+              <a:latin typeface="Noto Sans Black"/>
+            </a:endParaRPr>
           </a:p>
           <a:p>
             <a:pPr marL="565560" indent="-457200">
@@ -9271,12 +9267,41 @@
               <a:buChar char="Ø"/>
             </a:pPr>
             <a:r>
-              <a:rPr lang="en-US" sz="3200" b="0" strike="noStrike" spc="-1" dirty="0">
+              <a:rPr lang="en-US" sz="2800" b="0" strike="noStrike" spc="-1" dirty="0">
                 <a:latin typeface="Noto Sans Black"/>
               </a:rPr>
               <a:t>Randomized Search CV Model</a:t>
             </a:r>
           </a:p>
+        </p:txBody>
+      </p:sp>
+      <p:sp>
+        <p:nvSpPr>
+          <p:cNvPr id="7" name="TextBox 6">
+            <a:extLst>
+              <a:ext uri="{FF2B5EF4-FFF2-40B4-BE49-F238E27FC236}">
+                <a16:creationId xmlns:a16="http://schemas.microsoft.com/office/drawing/2014/main" id="{2866878E-67A1-44F5-B6AA-F1932DAC58AC}"/>
+              </a:ext>
+            </a:extLst>
+          </p:cNvPr>
+          <p:cNvSpPr txBox="1"/>
+          <p:nvPr/>
+        </p:nvSpPr>
+        <p:spPr>
+          <a:xfrm>
+            <a:off x="5040312" y="2214181"/>
+            <a:ext cx="4537395" cy="2964914"/>
+          </a:xfrm>
+          <a:prstGeom prst="rect">
+            <a:avLst/>
+          </a:prstGeom>
+          <a:noFill/>
+        </p:spPr>
+        <p:txBody>
+          <a:bodyPr wrap="square">
+            <a:spAutoFit/>
+          </a:bodyPr>
+          <a:lstStyle/>
           <a:p>
             <a:pPr marL="565560" indent="-457200">
               <a:lnSpc>
@@ -9293,11 +9318,30 @@
               <a:buChar char="Ø"/>
             </a:pPr>
             <a:r>
-              <a:rPr lang="en-US" sz="3200" spc="-1" dirty="0">
+              <a:rPr lang="en-US" sz="2800" spc="-1" dirty="0">
                 <a:latin typeface="Noto Sans Black"/>
               </a:rPr>
               <a:t>Support Vector Regressor</a:t>
             </a:r>
+          </a:p>
+          <a:p>
+            <a:pPr marL="565560" indent="-457200">
+              <a:lnSpc>
+                <a:spcPct val="100000"/>
+              </a:lnSpc>
+              <a:spcBef>
+                <a:spcPts val="1417"/>
+              </a:spcBef>
+              <a:buClr>
+                <a:srgbClr val="000000"/>
+              </a:buClr>
+              <a:buSzPct val="45000"/>
+              <a:buFont typeface="Wingdings" panose="05000000000000000000" pitchFamily="2" charset="2"/>
+              <a:buChar char="Ø"/>
+            </a:pPr>
+            <a:endParaRPr lang="en-US" sz="2800" spc="-1" dirty="0">
+              <a:latin typeface="Noto Sans Black"/>
+            </a:endParaRPr>
           </a:p>
           <a:p>
             <a:pPr marL="565560" indent="-457200">
@@ -9315,11 +9359,30 @@
               <a:buChar char="Ø"/>
             </a:pPr>
             <a:r>
-              <a:rPr lang="en-US" sz="3200" b="0" strike="noStrike" spc="-1" dirty="0">
+              <a:rPr lang="en-US" sz="2800" b="0" strike="noStrike" spc="-1" dirty="0">
                 <a:latin typeface="Noto Sans Black"/>
               </a:rPr>
               <a:t>Lasso Model</a:t>
             </a:r>
+          </a:p>
+          <a:p>
+            <a:pPr marL="565560" indent="-457200">
+              <a:lnSpc>
+                <a:spcPct val="100000"/>
+              </a:lnSpc>
+              <a:spcBef>
+                <a:spcPts val="1417"/>
+              </a:spcBef>
+              <a:buClr>
+                <a:srgbClr val="000000"/>
+              </a:buClr>
+              <a:buSzPct val="45000"/>
+              <a:buFont typeface="Wingdings" panose="05000000000000000000" pitchFamily="2" charset="2"/>
+              <a:buChar char="Ø"/>
+            </a:pPr>
+            <a:endParaRPr lang="en-US" sz="2800" b="0" strike="noStrike" spc="-1" dirty="0">
+              <a:latin typeface="Noto Sans Black"/>
+            </a:endParaRPr>
           </a:p>
           <a:p>
             <a:pPr marL="565560" indent="-457200">
@@ -9337,12 +9400,12 @@
               <a:buChar char="Ø"/>
             </a:pPr>
             <a:r>
-              <a:rPr lang="en-US" sz="3200" spc="-1" dirty="0">
+              <a:rPr lang="en-US" sz="2800" spc="-1" dirty="0">
                 <a:latin typeface="Noto Sans Black"/>
               </a:rPr>
               <a:t>Ridge Model</a:t>
             </a:r>
-            <a:endParaRPr lang="en-US" sz="3200" b="0" strike="noStrike" spc="-1" dirty="0">
+            <a:endParaRPr lang="en-US" sz="2800" b="0" strike="noStrike" spc="-1" dirty="0">
               <a:latin typeface="Noto Sans Black"/>
             </a:endParaRPr>
           </a:p>
@@ -11392,8 +11455,8 @@
         </p:nvSpPr>
         <p:spPr>
           <a:xfrm>
-            <a:off x="2903563" y="323161"/>
-            <a:ext cx="4270351" cy="956880"/>
+            <a:off x="1815311" y="323160"/>
+            <a:ext cx="6450001" cy="956880"/>
           </a:xfrm>
           <a:prstGeom prst="rect">
             <a:avLst/>
@@ -11437,7 +11500,7 @@
                 </a:solidFill>
                 <a:latin typeface="Noto Sans Black"/>
               </a:rPr>
-              <a:t>Website</a:t>
+              <a:t>Website and Heroku Deployment</a:t>
             </a:r>
           </a:p>
         </p:txBody>
@@ -11474,6 +11537,83 @@
           <a:fontRef idx="minor"/>
         </p:style>
       </p:sp>
+      <p:sp>
+        <p:nvSpPr>
+          <p:cNvPr id="5" name="TextBox 4">
+            <a:extLst>
+              <a:ext uri="{FF2B5EF4-FFF2-40B4-BE49-F238E27FC236}">
+                <a16:creationId xmlns:a16="http://schemas.microsoft.com/office/drawing/2014/main" id="{2DB19C38-F4EE-4262-A5EC-72FADA561916}"/>
+              </a:ext>
+            </a:extLst>
+          </p:cNvPr>
+          <p:cNvSpPr txBox="1"/>
+          <p:nvPr/>
+        </p:nvSpPr>
+        <p:spPr>
+          <a:xfrm>
+            <a:off x="1332035" y="3358634"/>
+            <a:ext cx="5829300" cy="369332"/>
+          </a:xfrm>
+          <a:prstGeom prst="rect">
+            <a:avLst/>
+          </a:prstGeom>
+          <a:noFill/>
+        </p:spPr>
+        <p:txBody>
+          <a:bodyPr wrap="square">
+            <a:spAutoFit/>
+          </a:bodyPr>
+          <a:lstStyle/>
+          <a:p>
+            <a:r>
+              <a:rPr lang="en-US" sz="1800" b="1" strike="noStrike" spc="-1" dirty="0">
+                <a:solidFill>
+                  <a:schemeClr val="bg1"/>
+                </a:solidFill>
+                <a:latin typeface="Noto Sans Black"/>
+              </a:rPr>
+              <a:t>Website</a:t>
+            </a:r>
+            <a:endParaRPr lang="en-US" dirty="0"/>
+          </a:p>
+        </p:txBody>
+      </p:sp>
+      <p:pic>
+        <p:nvPicPr>
+          <p:cNvPr id="6" name="Picture 5">
+            <a:extLst>
+              <a:ext uri="{FF2B5EF4-FFF2-40B4-BE49-F238E27FC236}">
+                <a16:creationId xmlns:a16="http://schemas.microsoft.com/office/drawing/2014/main" id="{FA23238B-C6A4-4035-87EF-656419E191B2}"/>
+              </a:ext>
+            </a:extLst>
+          </p:cNvPr>
+          <p:cNvPicPr>
+            <a:picLocks noChangeAspect="1"/>
+          </p:cNvPicPr>
+          <p:nvPr/>
+        </p:nvPicPr>
+        <p:blipFill>
+          <a:blip r:embed="rId3">
+            <a:extLst>
+              <a:ext uri="{28A0092B-C50C-407E-A947-70E740481C1C}">
+                <a14:useLocalDpi xmlns:a14="http://schemas.microsoft.com/office/drawing/2010/main" val="0"/>
+              </a:ext>
+            </a:extLst>
+          </a:blip>
+          <a:stretch>
+            <a:fillRect/>
+          </a:stretch>
+        </p:blipFill>
+        <p:spPr>
+          <a:xfrm>
+            <a:off x="473363" y="2066306"/>
+            <a:ext cx="9133895" cy="4704399"/>
+          </a:xfrm>
+          <a:prstGeom prst="rect">
+            <a:avLst/>
+          </a:prstGeom>
+        </p:spPr>
+      </p:pic>
     </p:spTree>
     <p:extLst>
       <p:ext uri="{BB962C8B-B14F-4D97-AF65-F5344CB8AC3E}">
@@ -11557,7 +11697,7 @@
                 </a:solidFill>
                 <a:latin typeface="Noto Sans Black"/>
               </a:rPr>
-              <a:t>Heroku Deployment</a:t>
+              <a:t>Going Forward</a:t>
             </a:r>
           </a:p>
         </p:txBody>
@@ -11594,125 +11734,97 @@
           <a:fontRef idx="minor"/>
         </p:style>
       </p:sp>
-    </p:spTree>
-    <p:extLst>
-      <p:ext uri="{BB962C8B-B14F-4D97-AF65-F5344CB8AC3E}">
-        <p14:creationId xmlns:p14="http://schemas.microsoft.com/office/powerpoint/2010/main" val="2536337996"/>
-      </p:ext>
-    </p:extLst>
-  </p:cSld>
-  <p:clrMapOvr>
-    <a:masterClrMapping/>
-  </p:clrMapOvr>
-</p:sld>
-</file>
-
-<file path=ppt/slides/slide16.xml><?xml version="1.0" encoding="utf-8"?>
-<p:sld xmlns:a="http://schemas.openxmlformats.org/drawingml/2006/main" xmlns:r="http://schemas.openxmlformats.org/officeDocument/2006/relationships" xmlns:p="http://schemas.openxmlformats.org/presentationml/2006/main">
-  <p:cSld>
-    <p:spTree>
-      <p:nvGrpSpPr>
-        <p:cNvPr id="1" name=""/>
-        <p:cNvGrpSpPr/>
-        <p:nvPr/>
-      </p:nvGrpSpPr>
-      <p:grpSpPr>
-        <a:xfrm>
-          <a:off x="0" y="0"/>
-          <a:ext cx="0" cy="0"/>
-          <a:chOff x="0" y="0"/>
-          <a:chExt cx="0" cy="0"/>
-        </a:xfrm>
-      </p:grpSpPr>
-      <p:sp>
-        <p:nvSpPr>
-          <p:cNvPr id="203" name="CustomShape 1"/>
-          <p:cNvSpPr/>
+      <p:sp>
+        <p:nvSpPr>
+          <p:cNvPr id="5" name="TextBox 4">
+            <a:extLst>
+              <a:ext uri="{FF2B5EF4-FFF2-40B4-BE49-F238E27FC236}">
+                <a16:creationId xmlns:a16="http://schemas.microsoft.com/office/drawing/2014/main" id="{258AC281-10E5-49E2-92CB-37AF7545C48B}"/>
+              </a:ext>
+            </a:extLst>
+          </p:cNvPr>
+          <p:cNvSpPr txBox="1"/>
           <p:nvPr/>
         </p:nvSpPr>
         <p:spPr>
           <a:xfrm>
-            <a:off x="2903563" y="323161"/>
-            <a:ext cx="4270351" cy="956880"/>
+            <a:off x="1683958" y="2468382"/>
+            <a:ext cx="6709559" cy="4401205"/>
           </a:xfrm>
           <a:prstGeom prst="rect">
             <a:avLst/>
           </a:prstGeom>
           <a:noFill/>
-          <a:ln>
-            <a:noFill/>
-          </a:ln>
-        </p:spPr>
-        <p:style>
-          <a:lnRef idx="0">
-            <a:scrgbClr r="0" g="0" b="0"/>
-          </a:lnRef>
-          <a:fillRef idx="0">
-            <a:scrgbClr r="0" g="0" b="0"/>
-          </a:fillRef>
-          <a:effectRef idx="0">
-            <a:scrgbClr r="0" g="0" b="0"/>
-          </a:effectRef>
-          <a:fontRef idx="minor"/>
-        </p:style>
-        <p:txBody>
-          <a:bodyPr lIns="0" tIns="0" rIns="0" bIns="0" anchor="ctr">
-            <a:noAutofit/>
+        </p:spPr>
+        <p:txBody>
+          <a:bodyPr wrap="square">
+            <a:spAutoFit/>
           </a:bodyPr>
           <a:lstStyle/>
           <a:p>
-            <a:pPr algn="ctr">
-              <a:spcBef>
-                <a:spcPts val="1417"/>
-              </a:spcBef>
-              <a:buClr>
-                <a:srgbClr val="000000"/>
-              </a:buClr>
-              <a:buSzPct val="45000"/>
+            <a:pPr marL="457200" indent="-457200">
+              <a:buFont typeface="Wingdings" panose="05000000000000000000" pitchFamily="2" charset="2"/>
+              <a:buChar char="Ø"/>
             </a:pPr>
             <a:r>
-              <a:rPr lang="en-US" sz="3600" b="1" strike="noStrike" spc="-1" dirty="0">
-                <a:solidFill>
-                  <a:schemeClr val="bg1"/>
-                </a:solidFill>
+              <a:rPr lang="en-US" sz="2800" dirty="0">
                 <a:latin typeface="Noto Sans Black"/>
               </a:rPr>
-              <a:t>Going Forward</a:t>
+              <a:t>Visualize data to show housing price trends on a map through an application such </a:t>
             </a:r>
-          </a:p>
-        </p:txBody>
-      </p:sp>
-      <p:sp>
-        <p:nvSpPr>
-          <p:cNvPr id="204" name="CustomShape 2"/>
-          <p:cNvSpPr/>
-          <p:nvPr/>
-        </p:nvSpPr>
-        <p:spPr>
-          <a:xfrm>
-            <a:off x="-1576164" y="1934081"/>
-            <a:ext cx="9358200" cy="5038920"/>
-          </a:xfrm>
-          <a:prstGeom prst="rect">
-            <a:avLst/>
-          </a:prstGeom>
-          <a:noFill/>
-          <a:ln>
-            <a:noFill/>
-          </a:ln>
-        </p:spPr>
-        <p:style>
-          <a:lnRef idx="0">
-            <a:scrgbClr r="0" g="0" b="0"/>
-          </a:lnRef>
-          <a:fillRef idx="0">
-            <a:scrgbClr r="0" g="0" b="0"/>
-          </a:fillRef>
-          <a:effectRef idx="0">
-            <a:scrgbClr r="0" g="0" b="0"/>
-          </a:effectRef>
-          <a:fontRef idx="minor"/>
-        </p:style>
+            <a:r>
+              <a:rPr lang="en-US" sz="2800">
+                <a:latin typeface="Noto Sans Black"/>
+              </a:rPr>
+              <a:t>as Tableau.</a:t>
+            </a:r>
+            <a:endParaRPr lang="en-US" sz="2800" dirty="0">
+              <a:latin typeface="Noto Sans Black"/>
+            </a:endParaRPr>
+          </a:p>
+          <a:p>
+            <a:pPr marL="457200" indent="-457200">
+              <a:buFont typeface="Wingdings" panose="05000000000000000000" pitchFamily="2" charset="2"/>
+              <a:buChar char="Ø"/>
+            </a:pPr>
+            <a:endParaRPr lang="en-US" sz="2800" dirty="0">
+              <a:latin typeface="Noto Sans Black"/>
+            </a:endParaRPr>
+          </a:p>
+          <a:p>
+            <a:pPr marL="457200" indent="-457200">
+              <a:buFont typeface="Wingdings" panose="05000000000000000000" pitchFamily="2" charset="2"/>
+              <a:buChar char="Ø"/>
+            </a:pPr>
+            <a:r>
+              <a:rPr lang="en-US" sz="2800" dirty="0">
+                <a:latin typeface="Noto Sans Black"/>
+              </a:rPr>
+              <a:t>​Scrape more recent data and see if the trends and predictions hold true.</a:t>
+            </a:r>
+          </a:p>
+          <a:p>
+            <a:pPr marL="457200" indent="-457200">
+              <a:buFont typeface="Wingdings" panose="05000000000000000000" pitchFamily="2" charset="2"/>
+              <a:buChar char="Ø"/>
+            </a:pPr>
+            <a:endParaRPr lang="en-US" sz="2800" dirty="0">
+              <a:latin typeface="Noto Sans Black"/>
+            </a:endParaRPr>
+          </a:p>
+          <a:p>
+            <a:pPr marL="457200" indent="-457200">
+              <a:buFont typeface="Wingdings" panose="05000000000000000000" pitchFamily="2" charset="2"/>
+              <a:buChar char="Ø"/>
+            </a:pPr>
+            <a:r>
+              <a:rPr lang="en-US" sz="2800" dirty="0">
+                <a:latin typeface="Noto Sans Black"/>
+              </a:rPr>
+              <a:t>Update the look and feel of the website to make it more user friendly and visually appealing.</a:t>
+            </a:r>
+          </a:p>
+        </p:txBody>
       </p:sp>
     </p:spTree>
     <p:extLst>
@@ -11727,7 +11839,7 @@
 </p:sld>
 </file>
 
-<file path=ppt/slides/slide17.xml><?xml version="1.0" encoding="utf-8"?>
+<file path=ppt/slides/slide16.xml><?xml version="1.0" encoding="utf-8"?>
 <p:sld xmlns:a="http://schemas.openxmlformats.org/drawingml/2006/main" xmlns:r="http://schemas.openxmlformats.org/officeDocument/2006/relationships" xmlns:p="http://schemas.openxmlformats.org/presentationml/2006/main">
   <p:cSld>
     <p:spTree>

</xml_diff>

<commit_message>
Added new image files. Renamed previous image files. Modified README, powerpoint presentation, notebook file
</commit_message>
<xml_diff>
--- a/Resources/housing_price_prediction.pptx
+++ b/Resources/housing_price_prediction.pptx
@@ -214,7 +214,7 @@
           <a:p>
             <a:fld id="{75FA2A23-8480-4A8E-BF93-96E9B2B75BFB}" type="datetimeFigureOut">
               <a:rPr lang="en-US" smtClean="0"/>
-              <a:t>12/1/2021</a:t>
+              <a:t>12/2/2021</a:t>
             </a:fld>
             <a:endParaRPr lang="en-US"/>
           </a:p>
@@ -1044,6 +1044,26 @@
             </a:r>
           </a:p>
           <a:p>
+            <a:pPr marL="171450" marR="0" lvl="0" indent="-171450" algn="l" defTabSz="914400" rtl="0" eaLnBrk="1" fontAlgn="auto" latinLnBrk="0" hangingPunct="1">
+              <a:lnSpc>
+                <a:spcPct val="100000"/>
+              </a:lnSpc>
+              <a:spcBef>
+                <a:spcPts val="0"/>
+              </a:spcBef>
+              <a:spcAft>
+                <a:spcPts val="0"/>
+              </a:spcAft>
+              <a:buClrTx/>
+              <a:buSzTx/>
+              <a:buFont typeface="Arial" panose="020B0604020202020204" pitchFamily="34" charset="0"/>
+              <a:buChar char="•"/>
+              <a:tabLst/>
+              <a:defRPr/>
+            </a:pPr>
+            <a:endParaRPr lang="en-US" dirty="0"/>
+          </a:p>
+          <a:p>
             <a:endParaRPr lang="en-US" dirty="0"/>
           </a:p>
         </p:txBody>
@@ -1649,7 +1669,7 @@
             </a:pPr>
             <a:r>
               <a:rPr lang="en-US" dirty="0"/>
-              <a:t>Briefly explain the architectural diagram</a:t>
+              <a:t>Briefly explain the project flowchart</a:t>
             </a:r>
           </a:p>
         </p:txBody>
@@ -9139,7 +9159,7 @@
               <a:buClr>
                 <a:srgbClr val="000000"/>
               </a:buClr>
-              <a:buSzPct val="45000"/>
+              <a:buSzPct val="100000"/>
               <a:buFont typeface="Wingdings" panose="05000000000000000000" pitchFamily="2" charset="2"/>
               <a:buChar char="Ø"/>
             </a:pPr>
@@ -9180,7 +9200,7 @@
               <a:buClr>
                 <a:srgbClr val="000000"/>
               </a:buClr>
-              <a:buSzPct val="45000"/>
+              <a:buSzPct val="100000"/>
               <a:buFont typeface="Wingdings" panose="05000000000000000000" pitchFamily="2" charset="2"/>
               <a:buChar char="Ø"/>
             </a:pPr>
@@ -9221,7 +9241,7 @@
               <a:buClr>
                 <a:srgbClr val="000000"/>
               </a:buClr>
-              <a:buSzPct val="45000"/>
+              <a:buSzPct val="100000"/>
               <a:buFont typeface="Wingdings" panose="05000000000000000000" pitchFamily="2" charset="2"/>
               <a:buChar char="Ø"/>
             </a:pPr>
@@ -9262,7 +9282,7 @@
               <a:buClr>
                 <a:srgbClr val="000000"/>
               </a:buClr>
-              <a:buSzPct val="45000"/>
+              <a:buSzPct val="100000"/>
               <a:buFont typeface="Wingdings" panose="05000000000000000000" pitchFamily="2" charset="2"/>
               <a:buChar char="Ø"/>
             </a:pPr>
@@ -9313,7 +9333,7 @@
               <a:buClr>
                 <a:srgbClr val="000000"/>
               </a:buClr>
-              <a:buSzPct val="45000"/>
+              <a:buSzPct val="100000"/>
               <a:buFont typeface="Wingdings" panose="05000000000000000000" pitchFamily="2" charset="2"/>
               <a:buChar char="Ø"/>
             </a:pPr>
@@ -9354,7 +9374,7 @@
               <a:buClr>
                 <a:srgbClr val="000000"/>
               </a:buClr>
-              <a:buSzPct val="45000"/>
+              <a:buSzPct val="100000"/>
               <a:buFont typeface="Wingdings" panose="05000000000000000000" pitchFamily="2" charset="2"/>
               <a:buChar char="Ø"/>
             </a:pPr>
@@ -9395,7 +9415,7 @@
               <a:buClr>
                 <a:srgbClr val="000000"/>
               </a:buClr>
-              <a:buSzPct val="45000"/>
+              <a:buSzPct val="100000"/>
               <a:buFont typeface="Wingdings" panose="05000000000000000000" pitchFamily="2" charset="2"/>
               <a:buChar char="Ø"/>
             </a:pPr>
@@ -11580,10 +11600,10 @@
       </p:sp>
       <p:pic>
         <p:nvPicPr>
-          <p:cNvPr id="6" name="Picture 5">
+          <p:cNvPr id="3" name="Picture 2">
             <a:extLst>
               <a:ext uri="{FF2B5EF4-FFF2-40B4-BE49-F238E27FC236}">
-                <a16:creationId xmlns:a16="http://schemas.microsoft.com/office/drawing/2014/main" id="{FA23238B-C6A4-4035-87EF-656419E191B2}"/>
+                <a16:creationId xmlns:a16="http://schemas.microsoft.com/office/drawing/2014/main" id="{92337FF5-00E6-433B-8CCA-F247D2222FBC}"/>
               </a:ext>
             </a:extLst>
           </p:cNvPr>
@@ -11592,7 +11612,7 @@
           </p:cNvPicPr>
           <p:nvPr/>
         </p:nvPicPr>
-        <p:blipFill>
+        <p:blipFill rotWithShape="1">
           <a:blip r:embed="rId3">
             <a:extLst>
               <a:ext uri="{28A0092B-C50C-407E-A947-70E740481C1C}">
@@ -11600,18 +11620,20 @@
               </a:ext>
             </a:extLst>
           </a:blip>
-          <a:stretch>
-            <a:fillRect/>
-          </a:stretch>
+          <a:srcRect l="553"/>
+          <a:stretch/>
         </p:blipFill>
         <p:spPr>
           <a:xfrm>
-            <a:off x="473363" y="2066306"/>
-            <a:ext cx="9133895" cy="4704399"/>
-          </a:xfrm>
-          <a:prstGeom prst="rect">
-            <a:avLst/>
-          </a:prstGeom>
+            <a:off x="387083" y="2124086"/>
+            <a:ext cx="9306456" cy="4444411"/>
+          </a:xfrm>
+          <a:prstGeom prst="rect">
+            <a:avLst/>
+          </a:prstGeom>
+          <a:effectLst>
+            <a:softEdge rad="31750"/>
+          </a:effectLst>
         </p:spPr>
       </p:pic>
     </p:spTree>
@@ -11748,8 +11770,8 @@
         </p:nvSpPr>
         <p:spPr>
           <a:xfrm>
-            <a:off x="1683958" y="2468382"/>
-            <a:ext cx="6709559" cy="4401205"/>
+            <a:off x="1500296" y="2361509"/>
+            <a:ext cx="7080032" cy="4154984"/>
           </a:xfrm>
           <a:prstGeom prst="rect">
             <a:avLst/>
@@ -11767,27 +11789,18 @@
               <a:buChar char="Ø"/>
             </a:pPr>
             <a:r>
-              <a:rPr lang="en-US" sz="2800" dirty="0">
+              <a:rPr lang="en-US" sz="2400" dirty="0">
                 <a:latin typeface="Noto Sans Black"/>
               </a:rPr>
-              <a:t>Visualize data to show housing price trends on a map through an application such </a:t>
+              <a:t>Visualize data to show housing price trends on a map through an application such as Tableau.</a:t>
             </a:r>
-            <a:r>
-              <a:rPr lang="en-US" sz="2800">
-                <a:latin typeface="Noto Sans Black"/>
-              </a:rPr>
-              <a:t>as Tableau.</a:t>
-            </a:r>
-            <a:endParaRPr lang="en-US" sz="2800" dirty="0">
-              <a:latin typeface="Noto Sans Black"/>
-            </a:endParaRPr>
           </a:p>
           <a:p>
             <a:pPr marL="457200" indent="-457200">
               <a:buFont typeface="Wingdings" panose="05000000000000000000" pitchFamily="2" charset="2"/>
               <a:buChar char="Ø"/>
             </a:pPr>
-            <a:endParaRPr lang="en-US" sz="2800" dirty="0">
+            <a:endParaRPr lang="en-US" sz="2400" dirty="0">
               <a:latin typeface="Noto Sans Black"/>
             </a:endParaRPr>
           </a:p>
@@ -11797,7 +11810,7 @@
               <a:buChar char="Ø"/>
             </a:pPr>
             <a:r>
-              <a:rPr lang="en-US" sz="2800" dirty="0">
+              <a:rPr lang="en-US" sz="2400" dirty="0">
                 <a:latin typeface="Noto Sans Black"/>
               </a:rPr>
               <a:t>​Scrape more recent data and see if the trends and predictions hold true.</a:t>
@@ -11808,7 +11821,7 @@
               <a:buFont typeface="Wingdings" panose="05000000000000000000" pitchFamily="2" charset="2"/>
               <a:buChar char="Ø"/>
             </a:pPr>
-            <a:endParaRPr lang="en-US" sz="2800" dirty="0">
+            <a:endParaRPr lang="en-US" sz="2400" dirty="0">
               <a:latin typeface="Noto Sans Black"/>
             </a:endParaRPr>
           </a:p>
@@ -11818,10 +11831,31 @@
               <a:buChar char="Ø"/>
             </a:pPr>
             <a:r>
-              <a:rPr lang="en-US" sz="2800" dirty="0">
+              <a:rPr lang="en-US" sz="2400" dirty="0">
                 <a:latin typeface="Noto Sans Black"/>
               </a:rPr>
               <a:t>Update the look and feel of the website to make it more user friendly and visually appealing.</a:t>
+            </a:r>
+          </a:p>
+          <a:p>
+            <a:pPr marL="457200" indent="-457200">
+              <a:buFont typeface="Wingdings" panose="05000000000000000000" pitchFamily="2" charset="2"/>
+              <a:buChar char="Ø"/>
+            </a:pPr>
+            <a:endParaRPr lang="en-US" sz="2400" dirty="0">
+              <a:latin typeface="Noto Sans Black"/>
+            </a:endParaRPr>
+          </a:p>
+          <a:p>
+            <a:pPr marL="457200" indent="-457200">
+              <a:buFont typeface="Wingdings" panose="05000000000000000000" pitchFamily="2" charset="2"/>
+              <a:buChar char="Ø"/>
+            </a:pPr>
+            <a:r>
+              <a:rPr lang="en-US" sz="2400" dirty="0">
+                <a:latin typeface="Noto Sans Black"/>
+              </a:rPr>
+              <a:t>Refine the parameters of our decision tree model to try and fix possible overfitting</a:t>
             </a:r>
           </a:p>
         </p:txBody>
@@ -11856,16 +11890,72 @@
           <a:chExt cx="0" cy="0"/>
         </a:xfrm>
       </p:grpSpPr>
-      <p:sp>
-        <p:nvSpPr>
-          <p:cNvPr id="223" name="CustomShape 1"/>
+      <p:pic>
+        <p:nvPicPr>
+          <p:cNvPr id="1026" name="Picture 2" descr="16,326 Sold sign Stock Photos, Sold sign Images | Depositphotos®">
+            <a:extLst>
+              <a:ext uri="{FF2B5EF4-FFF2-40B4-BE49-F238E27FC236}">
+                <a16:creationId xmlns:a16="http://schemas.microsoft.com/office/drawing/2014/main" id="{34A8448F-F972-47FF-8F54-AA8116408E4F}"/>
+              </a:ext>
+            </a:extLst>
+          </p:cNvPr>
+          <p:cNvPicPr>
+            <a:picLocks noChangeAspect="1" noChangeArrowheads="1"/>
+          </p:cNvPicPr>
+          <p:nvPr/>
+        </p:nvPicPr>
+        <p:blipFill>
+          <a:blip r:embed="rId3">
+            <a:extLst>
+              <a:ext uri="{28A0092B-C50C-407E-A947-70E740481C1C}">
+                <a14:useLocalDpi xmlns:a14="http://schemas.microsoft.com/office/drawing/2010/main" val="0"/>
+              </a:ext>
+            </a:extLst>
+          </a:blip>
+          <a:srcRect/>
+          <a:stretch>
+            <a:fillRect/>
+          </a:stretch>
+        </p:blipFill>
+        <p:spPr bwMode="auto">
+          <a:xfrm>
+            <a:off x="958542" y="1698171"/>
+            <a:ext cx="8163539" cy="5415148"/>
+          </a:xfrm>
+          <a:prstGeom prst="rect">
+            <a:avLst/>
+          </a:prstGeom>
+          <a:noFill/>
+          <a:effectLst>
+            <a:softEdge rad="317500"/>
+          </a:effectLst>
+          <a:extLst>
+            <a:ext uri="{909E8E84-426E-40DD-AFC4-6F175D3DCCD1}">
+              <a14:hiddenFill xmlns:a14="http://schemas.microsoft.com/office/drawing/2010/main">
+                <a:solidFill>
+                  <a:srgbClr val="FFFFFF"/>
+                </a:solidFill>
+              </a14:hiddenFill>
+            </a:ext>
+          </a:extLst>
+        </p:spPr>
+      </p:pic>
+      <p:sp>
+        <p:nvSpPr>
+          <p:cNvPr id="4" name="CustomShape 1">
+            <a:extLst>
+              <a:ext uri="{FF2B5EF4-FFF2-40B4-BE49-F238E27FC236}">
+                <a16:creationId xmlns:a16="http://schemas.microsoft.com/office/drawing/2014/main" id="{E3E75C94-6695-4B48-9641-E4D6C46AC7E1}"/>
+              </a:ext>
+            </a:extLst>
+          </p:cNvPr>
           <p:cNvSpPr/>
           <p:nvPr/>
         </p:nvSpPr>
         <p:spPr>
           <a:xfrm>
-            <a:off x="2699280" y="2699280"/>
-            <a:ext cx="4678200" cy="2158560"/>
+            <a:off x="2903563" y="323161"/>
+            <a:ext cx="4270351" cy="956880"/>
           </a:xfrm>
           <a:prstGeom prst="rect">
             <a:avLst/>
@@ -11888,29 +11978,65 @@
           <a:fontRef idx="minor"/>
         </p:style>
         <p:txBody>
-          <a:bodyPr lIns="0" tIns="0" rIns="0" bIns="0" anchor="ctr" anchorCtr="1">
+          <a:bodyPr lIns="0" tIns="0" rIns="0" bIns="0" anchor="ctr">
             <a:noAutofit/>
           </a:bodyPr>
           <a:lstStyle/>
           <a:p>
             <a:pPr algn="ctr">
-              <a:lnSpc>
-                <a:spcPct val="100000"/>
-              </a:lnSpc>
+              <a:spcBef>
+                <a:spcPts val="1417"/>
+              </a:spcBef>
+              <a:buClr>
+                <a:srgbClr val="000000"/>
+              </a:buClr>
+              <a:buSzPct val="45000"/>
             </a:pPr>
             <a:r>
               <a:rPr lang="en-US" sz="3600" b="1" strike="noStrike" spc="-1" dirty="0">
                 <a:solidFill>
-                  <a:srgbClr val="2C3E50"/>
+                  <a:schemeClr val="bg1"/>
                 </a:solidFill>
                 <a:latin typeface="Noto Sans Black"/>
-                <a:ea typeface="DejaVu Sans"/>
               </a:rPr>
-              <a:t>Thank You. That's All.</a:t>
+              <a:t>That’s </a:t>
             </a:r>
-            <a:endParaRPr lang="en-US" sz="3600" b="0" strike="noStrike" spc="-1" dirty="0">
-              <a:latin typeface="Arial"/>
-            </a:endParaRPr>
+            <a:r>
+              <a:rPr lang="en-US" sz="3600" b="1" spc="-1" dirty="0">
+                <a:solidFill>
+                  <a:schemeClr val="bg1"/>
+                </a:solidFill>
+                <a:latin typeface="Noto Sans Black"/>
+              </a:rPr>
+              <a:t>all. </a:t>
+            </a:r>
+            <a:r>
+              <a:rPr lang="en-US" sz="3600" b="1" strike="noStrike" spc="-1" dirty="0">
+                <a:solidFill>
+                  <a:schemeClr val="bg1"/>
+                </a:solidFill>
+                <a:latin typeface="Noto Sans Black"/>
+              </a:rPr>
+              <a:t>Thank </a:t>
+            </a:r>
+            <a:r>
+              <a:rPr lang="en-US" sz="3600" b="1" spc="-1" dirty="0">
+                <a:solidFill>
+                  <a:schemeClr val="bg1"/>
+                </a:solidFill>
+                <a:latin typeface="Noto Sans Black"/>
+              </a:rPr>
+              <a:t>y</a:t>
+            </a:r>
+            <a:r>
+              <a:rPr lang="en-US" sz="3600" b="1" strike="noStrike" spc="-1" dirty="0">
+                <a:solidFill>
+                  <a:schemeClr val="bg1"/>
+                </a:solidFill>
+                <a:latin typeface="Noto Sans Black"/>
+              </a:rPr>
+              <a:t>ou!</a:t>
+            </a:r>
           </a:p>
         </p:txBody>
       </p:sp>
@@ -12068,7 +12194,7 @@
         </p:nvSpPr>
         <p:spPr>
           <a:xfrm>
-            <a:off x="314628" y="2680789"/>
+            <a:off x="112753" y="2680789"/>
             <a:ext cx="4301464" cy="3635900"/>
           </a:xfrm>
           <a:prstGeom prst="rect">
@@ -12161,12 +12287,15 @@
         </p:blipFill>
         <p:spPr>
           <a:xfrm>
-            <a:off x="4810184" y="2931709"/>
-            <a:ext cx="4907656" cy="3134060"/>
-          </a:xfrm>
-          <a:prstGeom prst="rect">
-            <a:avLst/>
-          </a:prstGeom>
+            <a:off x="4346016" y="2680789"/>
+            <a:ext cx="5693492" cy="3635900"/>
+          </a:xfrm>
+          <a:prstGeom prst="rect">
+            <a:avLst/>
+          </a:prstGeom>
+          <a:effectLst>
+            <a:softEdge rad="317500"/>
+          </a:effectLst>
         </p:spPr>
       </p:pic>
     </p:spTree>
@@ -12250,7 +12379,7 @@
                 <a:ea typeface="Nirmala UI Semilight" panose="020B0402040204020203" pitchFamily="34" charset="0"/>
                 <a:cs typeface="Nirmala UI Semilight" panose="020B0402040204020203" pitchFamily="34" charset="0"/>
               </a:rPr>
-              <a:t>Architectural Diagram</a:t>
+              <a:t>Project Flowchart</a:t>
             </a:r>
             <a:endParaRPr lang="en-US" sz="3600" b="1" strike="noStrike" spc="-1" dirty="0">
               <a:solidFill>
@@ -13081,7 +13210,7 @@
         </p:blipFill>
         <p:spPr bwMode="auto">
           <a:xfrm>
-            <a:off x="6088212" y="2400056"/>
+            <a:off x="6100087" y="2400056"/>
             <a:ext cx="977860" cy="526350"/>
           </a:xfrm>
           <a:prstGeom prst="rect">
@@ -13293,7 +13422,7 @@
         </p:blipFill>
         <p:spPr bwMode="auto">
           <a:xfrm>
-            <a:off x="7197223" y="2345588"/>
+            <a:off x="7232848" y="2345588"/>
             <a:ext cx="650950" cy="640897"/>
           </a:xfrm>
           <a:prstGeom prst="rect">
@@ -14785,8 +14914,8 @@
         </p:blipFill>
         <p:spPr>
           <a:xfrm>
-            <a:off x="5079285" y="4400436"/>
-            <a:ext cx="4699924" cy="2472121"/>
+            <a:off x="5040309" y="4406202"/>
+            <a:ext cx="4745153" cy="2472121"/>
           </a:xfrm>
           <a:prstGeom prst="rect">
             <a:avLst/>
@@ -14815,8 +14944,8 @@
         </p:blipFill>
         <p:spPr>
           <a:xfrm>
-            <a:off x="5079285" y="1928315"/>
-            <a:ext cx="4699924" cy="2472121"/>
+            <a:off x="5040310" y="1934081"/>
+            <a:ext cx="4667207" cy="2472121"/>
           </a:xfrm>
           <a:prstGeom prst="rect">
             <a:avLst/>
@@ -14845,8 +14974,8 @@
         </p:blipFill>
         <p:spPr>
           <a:xfrm>
-            <a:off x="334133" y="1928315"/>
-            <a:ext cx="4745153" cy="2472121"/>
+            <a:off x="217214" y="1934081"/>
+            <a:ext cx="4823098" cy="2472121"/>
           </a:xfrm>
           <a:prstGeom prst="rect">
             <a:avLst/>
@@ -14875,8 +15004,8 @@
         </p:blipFill>
         <p:spPr>
           <a:xfrm>
-            <a:off x="334133" y="4400436"/>
-            <a:ext cx="4745152" cy="2472121"/>
+            <a:off x="295157" y="4406202"/>
+            <a:ext cx="4745153" cy="2472121"/>
           </a:xfrm>
           <a:prstGeom prst="rect">
             <a:avLst/>

</xml_diff>